<commit_message>
add updates to presentation
</commit_message>
<xml_diff>
--- a/assets/Meal Crafter.pptx
+++ b/assets/Meal Crafter.pptx
@@ -6789,6 +6789,21 @@
                 <a:spcPts val="1600"/>
               </a:spcAft>
             </a:pPr>
+            <a:r>
+              <a:rPr lang="en-US" dirty="0"/>
+              <a:t>A price comparison for all the grocery stores near the user. A shopping list that tells the user which store would be the cheapest to get their groceries at.</a:t>
+            </a:r>
+          </a:p>
+          <a:p>
+            <a:pPr marL="285750" indent="-285750">
+              <a:spcAft>
+                <a:spcPts val="1600"/>
+              </a:spcAft>
+            </a:pPr>
+            <a:r>
+              <a:rPr lang="en-US" dirty="0"/>
+              <a:t>A shopping list that provides the aisle number for ingredient the user needs for a recipe. </a:t>
+            </a:r>
             <a:endParaRPr dirty="0"/>
           </a:p>
         </p:txBody>

</xml_diff>

<commit_message>
updated elevator pitch slide
</commit_message>
<xml_diff>
--- a/assets/Meal Crafter.pptx
+++ b/assets/Meal Crafter.pptx
@@ -889,7 +889,15 @@
             </a:pPr>
             <a:r>
               <a:rPr lang="en-US" dirty="0"/>
-              <a:t>This app allows for the consumer to not only discover new meals, but also provide them with a list of ingredients to help make shopping easier and quicker. </a:t>
+              <a:t>Our app, Meal Crafter, is a 5-day meal planner. This app allows for the consumer to not only discover new meals, but also provide them with a list of ingredients to help make shopping easier and quicker. Meal Crafter allows for the consumer to plan out their meals for breakfast, lunch, and dinner. The app not only provides the consumer with the ingredients and type of meal, but also the instructions on how to make the meal as well. We hope that the Meal Crafter allows for our consumers to be less stressed when it comes to weekly meal prepping</a:t>
+            </a:r>
+            <a:r>
+              <a:rPr lang="en-US"/>
+              <a:t>. The </a:t>
+            </a:r>
+            <a:r>
+              <a:rPr lang="en-US" dirty="0"/>
+              <a:t>Meal Crafter is not only just for meal preppers, but also is for the everyday foodie who wants to experiment and try new cuisines. </a:t>
             </a:r>
             <a:endParaRPr dirty="0"/>
           </a:p>

</xml_diff>